<commit_message>
fixed first slide in presentation
</commit_message>
<xml_diff>
--- a/docs/demonstration/demonstration.pptx
+++ b/docs/demonstration/demonstration.pptx
@@ -5156,8 +5156,8 @@
         </p:nvSpPr>
         <p:spPr>
           <a:xfrm>
-            <a:off x="1524000" y="3930635"/>
-            <a:ext cx="9144000" cy="1655762"/>
+            <a:off x="1524000" y="3567532"/>
+            <a:ext cx="9144000" cy="2018865"/>
           </a:xfrm>
         </p:spPr>
         <p:txBody>
@@ -5165,6 +5165,18 @@
             <a:normAutofit/>
           </a:bodyPr>
           <a:lstStyle/>
+          <a:p>
+            <a:r>
+              <a:rPr lang="pt-PT" sz="2000" b="1" dirty="0">
+                <a:solidFill>
+                  <a:srgbClr val="3D4D55"/>
+                </a:solidFill>
+                <a:latin typeface="Arial" panose="020B0604020202020204" pitchFamily="34" charset="0"/>
+                <a:cs typeface="Arial" panose="020B0604020202020204" pitchFamily="34" charset="0"/>
+              </a:rPr>
+              <a:t>Grupo 09</a:t>
+            </a:r>
+          </a:p>
           <a:p>
             <a:r>
               <a:rPr lang="pt-PT" sz="2000" dirty="0">
@@ -5246,7 +5258,7 @@
         </p:blipFill>
         <p:spPr>
           <a:xfrm>
-            <a:off x="6385972" y="1687955"/>
+            <a:off x="6385972" y="1475164"/>
             <a:ext cx="3810000" cy="1838325"/>
           </a:xfrm>
           <a:prstGeom prst="rect">
@@ -5309,7 +5321,7 @@
         </p:nvSpPr>
         <p:spPr>
           <a:xfrm>
-            <a:off x="1806259" y="1579756"/>
+            <a:off x="1806259" y="1366965"/>
             <a:ext cx="6885581" cy="2018864"/>
           </a:xfrm>
           <a:prstGeom prst="rect">
@@ -5703,7 +5715,7 @@
         </p:nvCxnSpPr>
         <p:spPr>
           <a:xfrm>
-            <a:off x="6095999" y="1579756"/>
+            <a:off x="6059488" y="1366965"/>
             <a:ext cx="0" cy="2018864"/>
           </a:xfrm>
           <a:prstGeom prst="line">

</xml_diff>